<commit_message>
Add how many runs
</commit_message>
<xml_diff>
--- a/1512211-1412235.pptx
+++ b/1512211-1412235.pptx
@@ -871,7 +871,7 @@
           <a:p>
             <a:fld id="{A2DD742E-5A9F-465A-8E2B-D3DD7D539B86}" type="datetimeFigureOut">
               <a:rPr lang="en-US" smtClean="0"/>
-              <a:t>1/6/2020</a:t>
+              <a:t>1/7/2020</a:t>
             </a:fld>
             <a:endParaRPr lang="en-US"/>
           </a:p>
@@ -1122,7 +1122,7 @@
           <a:p>
             <a:fld id="{A2DD742E-5A9F-465A-8E2B-D3DD7D539B86}" type="datetimeFigureOut">
               <a:rPr lang="en-US" smtClean="0"/>
-              <a:t>1/6/2020</a:t>
+              <a:t>1/7/2020</a:t>
             </a:fld>
             <a:endParaRPr lang="en-US"/>
           </a:p>
@@ -1436,7 +1436,7 @@
           <a:p>
             <a:fld id="{A2DD742E-5A9F-465A-8E2B-D3DD7D539B86}" type="datetimeFigureOut">
               <a:rPr lang="en-US" smtClean="0"/>
-              <a:t>1/6/2020</a:t>
+              <a:t>1/7/2020</a:t>
             </a:fld>
             <a:endParaRPr lang="en-US"/>
           </a:p>
@@ -1777,7 +1777,7 @@
           <a:p>
             <a:fld id="{A2DD742E-5A9F-465A-8E2B-D3DD7D539B86}" type="datetimeFigureOut">
               <a:rPr lang="en-US" smtClean="0"/>
-              <a:t>1/6/2020</a:t>
+              <a:t>1/7/2020</a:t>
             </a:fld>
             <a:endParaRPr lang="en-US"/>
           </a:p>
@@ -2091,7 +2091,7 @@
           <a:p>
             <a:fld id="{A2DD742E-5A9F-465A-8E2B-D3DD7D539B86}" type="datetimeFigureOut">
               <a:rPr lang="en-US" smtClean="0"/>
-              <a:t>1/6/2020</a:t>
+              <a:t>1/7/2020</a:t>
             </a:fld>
             <a:endParaRPr lang="en-US"/>
           </a:p>
@@ -2484,7 +2484,7 @@
           <a:p>
             <a:fld id="{A2DD742E-5A9F-465A-8E2B-D3DD7D539B86}" type="datetimeFigureOut">
               <a:rPr lang="en-US" smtClean="0"/>
-              <a:t>1/6/2020</a:t>
+              <a:t>1/7/2020</a:t>
             </a:fld>
             <a:endParaRPr lang="en-US"/>
           </a:p>
@@ -2654,7 +2654,7 @@
           <a:p>
             <a:fld id="{A2DD742E-5A9F-465A-8E2B-D3DD7D539B86}" type="datetimeFigureOut">
               <a:rPr lang="en-US" smtClean="0"/>
-              <a:t>1/6/2020</a:t>
+              <a:t>1/7/2020</a:t>
             </a:fld>
             <a:endParaRPr lang="en-US"/>
           </a:p>
@@ -2834,7 +2834,7 @@
           <a:p>
             <a:fld id="{A2DD742E-5A9F-465A-8E2B-D3DD7D539B86}" type="datetimeFigureOut">
               <a:rPr lang="en-US" smtClean="0"/>
-              <a:t>1/6/2020</a:t>
+              <a:t>1/7/2020</a:t>
             </a:fld>
             <a:endParaRPr lang="en-US"/>
           </a:p>
@@ -3010,7 +3010,7 @@
           <a:p>
             <a:fld id="{A2DD742E-5A9F-465A-8E2B-D3DD7D539B86}" type="datetimeFigureOut">
               <a:rPr lang="en-US" smtClean="0"/>
-              <a:t>1/6/2020</a:t>
+              <a:t>1/7/2020</a:t>
             </a:fld>
             <a:endParaRPr lang="en-US"/>
           </a:p>
@@ -3257,7 +3257,7 @@
           <a:p>
             <a:fld id="{A2DD742E-5A9F-465A-8E2B-D3DD7D539B86}" type="datetimeFigureOut">
               <a:rPr lang="en-US" smtClean="0"/>
-              <a:t>1/6/2020</a:t>
+              <a:t>1/7/2020</a:t>
             </a:fld>
             <a:endParaRPr lang="en-US"/>
           </a:p>
@@ -3489,7 +3489,7 @@
           <a:p>
             <a:fld id="{A2DD742E-5A9F-465A-8E2B-D3DD7D539B86}" type="datetimeFigureOut">
               <a:rPr lang="en-US" smtClean="0"/>
-              <a:t>1/6/2020</a:t>
+              <a:t>1/7/2020</a:t>
             </a:fld>
             <a:endParaRPr lang="en-US"/>
           </a:p>
@@ -3863,7 +3863,7 @@
           <a:p>
             <a:fld id="{A2DD742E-5A9F-465A-8E2B-D3DD7D539B86}" type="datetimeFigureOut">
               <a:rPr lang="en-US" smtClean="0"/>
-              <a:t>1/6/2020</a:t>
+              <a:t>1/7/2020</a:t>
             </a:fld>
             <a:endParaRPr lang="en-US"/>
           </a:p>
@@ -3986,7 +3986,7 @@
           <a:p>
             <a:fld id="{A2DD742E-5A9F-465A-8E2B-D3DD7D539B86}" type="datetimeFigureOut">
               <a:rPr lang="en-US" smtClean="0"/>
-              <a:t>1/6/2020</a:t>
+              <a:t>1/7/2020</a:t>
             </a:fld>
             <a:endParaRPr lang="en-US"/>
           </a:p>
@@ -4081,7 +4081,7 @@
           <a:p>
             <a:fld id="{A2DD742E-5A9F-465A-8E2B-D3DD7D539B86}" type="datetimeFigureOut">
               <a:rPr lang="en-US" smtClean="0"/>
-              <a:t>1/6/2020</a:t>
+              <a:t>1/7/2020</a:t>
             </a:fld>
             <a:endParaRPr lang="en-US"/>
           </a:p>
@@ -4336,7 +4336,7 @@
           <a:p>
             <a:fld id="{A2DD742E-5A9F-465A-8E2B-D3DD7D539B86}" type="datetimeFigureOut">
               <a:rPr lang="en-US" smtClean="0"/>
-              <a:t>1/6/2020</a:t>
+              <a:t>1/7/2020</a:t>
             </a:fld>
             <a:endParaRPr lang="en-US"/>
           </a:p>
@@ -4599,7 +4599,7 @@
           <a:p>
             <a:fld id="{A2DD742E-5A9F-465A-8E2B-D3DD7D539B86}" type="datetimeFigureOut">
               <a:rPr lang="en-US" smtClean="0"/>
-              <a:t>1/6/2020</a:t>
+              <a:t>1/7/2020</a:t>
             </a:fld>
             <a:endParaRPr lang="en-US"/>
           </a:p>
@@ -5342,7 +5342,7 @@
           <a:p>
             <a:fld id="{A2DD742E-5A9F-465A-8E2B-D3DD7D539B86}" type="datetimeFigureOut">
               <a:rPr lang="en-US" smtClean="0"/>
-              <a:t>1/6/2020</a:t>
+              <a:t>1/7/2020</a:t>
             </a:fld>
             <a:endParaRPr lang="en-US"/>
           </a:p>
@@ -6930,8 +6930,65 @@
           <a:p>
             <a:r>
               <a:rPr lang="en-US" dirty="0"/>
-              <a:t>I. BASELINE</a:t>
-            </a:r>
+              <a:t>I. BASELINE (</a:t>
+            </a:r>
+            <a:r>
+              <a:rPr lang="en-US" dirty="0" err="1"/>
+              <a:t>Thời</a:t>
+            </a:r>
+            <a:r>
+              <a:rPr lang="en-US" dirty="0"/>
+              <a:t> </a:t>
+            </a:r>
+            <a:r>
+              <a:rPr lang="en-US" dirty="0" err="1"/>
+              <a:t>gian</a:t>
+            </a:r>
+            <a:r>
+              <a:rPr lang="en-US" dirty="0"/>
+              <a:t> </a:t>
+            </a:r>
+            <a:r>
+              <a:rPr lang="en-US" dirty="0" err="1"/>
+              <a:t>trung</a:t>
+            </a:r>
+            <a:r>
+              <a:rPr lang="en-US" dirty="0"/>
+              <a:t> </a:t>
+            </a:r>
+            <a:r>
+              <a:rPr lang="en-US" dirty="0" err="1"/>
+              <a:t>bình</a:t>
+            </a:r>
+            <a:r>
+              <a:rPr lang="en-US" dirty="0"/>
+              <a:t> </a:t>
+            </a:r>
+            <a:r>
+              <a:rPr lang="en-US" dirty="0" err="1"/>
+              <a:t>trong</a:t>
+            </a:r>
+            <a:r>
+              <a:rPr lang="en-US" dirty="0"/>
+              <a:t> 5 </a:t>
+            </a:r>
+            <a:r>
+              <a:rPr lang="en-US" dirty="0" err="1"/>
+              <a:t>lần</a:t>
+            </a:r>
+            <a:r>
+              <a:rPr lang="en-US" dirty="0"/>
+              <a:t> </a:t>
+            </a:r>
+            <a:r>
+              <a:rPr lang="en-US" dirty="0" err="1"/>
+              <a:t>chạy</a:t>
+            </a:r>
+            <a:r>
+              <a:rPr lang="en-US"/>
+              <a:t>)</a:t>
+            </a:r>
+            <a:endParaRPr lang="en-US" dirty="0"/>
           </a:p>
         </p:txBody>
       </p:sp>
@@ -9957,7 +10014,54 @@
           <a:bodyPr/>
           <a:lstStyle/>
           <a:p>
-            <a:endParaRPr lang="en-US"/>
+            <a:r>
+              <a:rPr lang="en-US" dirty="0" err="1"/>
+              <a:t>Thời</a:t>
+            </a:r>
+            <a:r>
+              <a:rPr lang="en-US" dirty="0"/>
+              <a:t> </a:t>
+            </a:r>
+            <a:r>
+              <a:rPr lang="en-US" dirty="0" err="1"/>
+              <a:t>gian</a:t>
+            </a:r>
+            <a:r>
+              <a:rPr lang="en-US" dirty="0"/>
+              <a:t> </a:t>
+            </a:r>
+            <a:r>
+              <a:rPr lang="en-US" dirty="0" err="1"/>
+              <a:t>trung</a:t>
+            </a:r>
+            <a:r>
+              <a:rPr lang="en-US" dirty="0"/>
+              <a:t> </a:t>
+            </a:r>
+            <a:r>
+              <a:rPr lang="en-US" dirty="0" err="1"/>
+              <a:t>bình</a:t>
+            </a:r>
+            <a:r>
+              <a:rPr lang="en-US" dirty="0"/>
+              <a:t> (5 </a:t>
+            </a:r>
+            <a:r>
+              <a:rPr lang="en-US" dirty="0" err="1"/>
+              <a:t>lần</a:t>
+            </a:r>
+            <a:r>
+              <a:rPr lang="en-US" dirty="0"/>
+              <a:t> </a:t>
+            </a:r>
+            <a:r>
+              <a:rPr lang="en-US" dirty="0" err="1"/>
+              <a:t>chạy</a:t>
+            </a:r>
+            <a:r>
+              <a:rPr lang="en-US" dirty="0"/>
+              <a:t>)</a:t>
+            </a:r>
           </a:p>
         </p:txBody>
       </p:sp>

</xml_diff>